<commit_message>
finshed implementation of MyArray class
</commit_message>
<xml_diff>
--- a/labs/labs/lab3/documents/drawing.pptx
+++ b/labs/labs/lab3/documents/drawing.pptx
@@ -258,7 +258,7 @@
           <a:p>
             <a:fld id="{132D6BD4-870A-4FF1-8611-FF08CC753B3A}" type="datetimeFigureOut">
               <a:rPr lang="en-CA" smtClean="0"/>
-              <a:t>2023-10-07</a:t>
+              <a:t>2023-10-11</a:t>
             </a:fld>
             <a:endParaRPr lang="en-CA"/>
           </a:p>
@@ -428,7 +428,7 @@
           <a:p>
             <a:fld id="{132D6BD4-870A-4FF1-8611-FF08CC753B3A}" type="datetimeFigureOut">
               <a:rPr lang="en-CA" smtClean="0"/>
-              <a:t>2023-10-07</a:t>
+              <a:t>2023-10-11</a:t>
             </a:fld>
             <a:endParaRPr lang="en-CA"/>
           </a:p>
@@ -608,7 +608,7 @@
           <a:p>
             <a:fld id="{132D6BD4-870A-4FF1-8611-FF08CC753B3A}" type="datetimeFigureOut">
               <a:rPr lang="en-CA" smtClean="0"/>
-              <a:t>2023-10-07</a:t>
+              <a:t>2023-10-11</a:t>
             </a:fld>
             <a:endParaRPr lang="en-CA"/>
           </a:p>
@@ -778,7 +778,7 @@
           <a:p>
             <a:fld id="{132D6BD4-870A-4FF1-8611-FF08CC753B3A}" type="datetimeFigureOut">
               <a:rPr lang="en-CA" smtClean="0"/>
-              <a:t>2023-10-07</a:t>
+              <a:t>2023-10-11</a:t>
             </a:fld>
             <a:endParaRPr lang="en-CA"/>
           </a:p>
@@ -1022,7 +1022,7 @@
           <a:p>
             <a:fld id="{132D6BD4-870A-4FF1-8611-FF08CC753B3A}" type="datetimeFigureOut">
               <a:rPr lang="en-CA" smtClean="0"/>
-              <a:t>2023-10-07</a:t>
+              <a:t>2023-10-11</a:t>
             </a:fld>
             <a:endParaRPr lang="en-CA"/>
           </a:p>
@@ -1254,7 +1254,7 @@
           <a:p>
             <a:fld id="{132D6BD4-870A-4FF1-8611-FF08CC753B3A}" type="datetimeFigureOut">
               <a:rPr lang="en-CA" smtClean="0"/>
-              <a:t>2023-10-07</a:t>
+              <a:t>2023-10-11</a:t>
             </a:fld>
             <a:endParaRPr lang="en-CA"/>
           </a:p>
@@ -1621,7 +1621,7 @@
           <a:p>
             <a:fld id="{132D6BD4-870A-4FF1-8611-FF08CC753B3A}" type="datetimeFigureOut">
               <a:rPr lang="en-CA" smtClean="0"/>
-              <a:t>2023-10-07</a:t>
+              <a:t>2023-10-11</a:t>
             </a:fld>
             <a:endParaRPr lang="en-CA"/>
           </a:p>
@@ -1739,7 +1739,7 @@
           <a:p>
             <a:fld id="{132D6BD4-870A-4FF1-8611-FF08CC753B3A}" type="datetimeFigureOut">
               <a:rPr lang="en-CA" smtClean="0"/>
-              <a:t>2023-10-07</a:t>
+              <a:t>2023-10-11</a:t>
             </a:fld>
             <a:endParaRPr lang="en-CA"/>
           </a:p>
@@ -1834,7 +1834,7 @@
           <a:p>
             <a:fld id="{132D6BD4-870A-4FF1-8611-FF08CC753B3A}" type="datetimeFigureOut">
               <a:rPr lang="en-CA" smtClean="0"/>
-              <a:t>2023-10-07</a:t>
+              <a:t>2023-10-11</a:t>
             </a:fld>
             <a:endParaRPr lang="en-CA"/>
           </a:p>
@@ -2111,7 +2111,7 @@
           <a:p>
             <a:fld id="{132D6BD4-870A-4FF1-8611-FF08CC753B3A}" type="datetimeFigureOut">
               <a:rPr lang="en-CA" smtClean="0"/>
-              <a:t>2023-10-07</a:t>
+              <a:t>2023-10-11</a:t>
             </a:fld>
             <a:endParaRPr lang="en-CA"/>
           </a:p>
@@ -2368,7 +2368,7 @@
           <a:p>
             <a:fld id="{132D6BD4-870A-4FF1-8611-FF08CC753B3A}" type="datetimeFigureOut">
               <a:rPr lang="en-CA" smtClean="0"/>
-              <a:t>2023-10-07</a:t>
+              <a:t>2023-10-11</a:t>
             </a:fld>
             <a:endParaRPr lang="en-CA"/>
           </a:p>
@@ -2581,7 +2581,7 @@
           <a:p>
             <a:fld id="{132D6BD4-870A-4FF1-8611-FF08CC753B3A}" type="datetimeFigureOut">
               <a:rPr lang="en-CA" smtClean="0"/>
-              <a:t>2023-10-07</a:t>
+              <a:t>2023-10-11</a:t>
             </a:fld>
             <a:endParaRPr lang="en-CA"/>
           </a:p>
@@ -5466,8 +5466,8 @@
         </p:nvGrpSpPr>
         <p:grpSpPr>
           <a:xfrm>
-            <a:off x="2899410" y="10485262"/>
-            <a:ext cx="1376730" cy="525780"/>
+            <a:off x="2899410" y="10485261"/>
+            <a:ext cx="1745615" cy="452613"/>
             <a:chOff x="3497580" y="4312920"/>
             <a:chExt cx="1376730" cy="525780"/>
           </a:xfrm>

</xml_diff>

<commit_message>
updated lab 3 report
</commit_message>
<xml_diff>
--- a/labs/labs/lab3/documents/drawing.pptx
+++ b/labs/labs/lab3/documents/drawing.pptx
@@ -258,7 +258,7 @@
           <a:p>
             <a:fld id="{132D6BD4-870A-4FF1-8611-FF08CC753B3A}" type="datetimeFigureOut">
               <a:rPr lang="en-CA" smtClean="0"/>
-              <a:t>2023-10-11</a:t>
+              <a:t>2023-10-12</a:t>
             </a:fld>
             <a:endParaRPr lang="en-CA"/>
           </a:p>
@@ -428,7 +428,7 @@
           <a:p>
             <a:fld id="{132D6BD4-870A-4FF1-8611-FF08CC753B3A}" type="datetimeFigureOut">
               <a:rPr lang="en-CA" smtClean="0"/>
-              <a:t>2023-10-11</a:t>
+              <a:t>2023-10-12</a:t>
             </a:fld>
             <a:endParaRPr lang="en-CA"/>
           </a:p>
@@ -608,7 +608,7 @@
           <a:p>
             <a:fld id="{132D6BD4-870A-4FF1-8611-FF08CC753B3A}" type="datetimeFigureOut">
               <a:rPr lang="en-CA" smtClean="0"/>
-              <a:t>2023-10-11</a:t>
+              <a:t>2023-10-12</a:t>
             </a:fld>
             <a:endParaRPr lang="en-CA"/>
           </a:p>
@@ -778,7 +778,7 @@
           <a:p>
             <a:fld id="{132D6BD4-870A-4FF1-8611-FF08CC753B3A}" type="datetimeFigureOut">
               <a:rPr lang="en-CA" smtClean="0"/>
-              <a:t>2023-10-11</a:t>
+              <a:t>2023-10-12</a:t>
             </a:fld>
             <a:endParaRPr lang="en-CA"/>
           </a:p>
@@ -1022,7 +1022,7 @@
           <a:p>
             <a:fld id="{132D6BD4-870A-4FF1-8611-FF08CC753B3A}" type="datetimeFigureOut">
               <a:rPr lang="en-CA" smtClean="0"/>
-              <a:t>2023-10-11</a:t>
+              <a:t>2023-10-12</a:t>
             </a:fld>
             <a:endParaRPr lang="en-CA"/>
           </a:p>
@@ -1254,7 +1254,7 @@
           <a:p>
             <a:fld id="{132D6BD4-870A-4FF1-8611-FF08CC753B3A}" type="datetimeFigureOut">
               <a:rPr lang="en-CA" smtClean="0"/>
-              <a:t>2023-10-11</a:t>
+              <a:t>2023-10-12</a:t>
             </a:fld>
             <a:endParaRPr lang="en-CA"/>
           </a:p>
@@ -1621,7 +1621,7 @@
           <a:p>
             <a:fld id="{132D6BD4-870A-4FF1-8611-FF08CC753B3A}" type="datetimeFigureOut">
               <a:rPr lang="en-CA" smtClean="0"/>
-              <a:t>2023-10-11</a:t>
+              <a:t>2023-10-12</a:t>
             </a:fld>
             <a:endParaRPr lang="en-CA"/>
           </a:p>
@@ -1739,7 +1739,7 @@
           <a:p>
             <a:fld id="{132D6BD4-870A-4FF1-8611-FF08CC753B3A}" type="datetimeFigureOut">
               <a:rPr lang="en-CA" smtClean="0"/>
-              <a:t>2023-10-11</a:t>
+              <a:t>2023-10-12</a:t>
             </a:fld>
             <a:endParaRPr lang="en-CA"/>
           </a:p>
@@ -1834,7 +1834,7 @@
           <a:p>
             <a:fld id="{132D6BD4-870A-4FF1-8611-FF08CC753B3A}" type="datetimeFigureOut">
               <a:rPr lang="en-CA" smtClean="0"/>
-              <a:t>2023-10-11</a:t>
+              <a:t>2023-10-12</a:t>
             </a:fld>
             <a:endParaRPr lang="en-CA"/>
           </a:p>
@@ -2111,7 +2111,7 @@
           <a:p>
             <a:fld id="{132D6BD4-870A-4FF1-8611-FF08CC753B3A}" type="datetimeFigureOut">
               <a:rPr lang="en-CA" smtClean="0"/>
-              <a:t>2023-10-11</a:t>
+              <a:t>2023-10-12</a:t>
             </a:fld>
             <a:endParaRPr lang="en-CA"/>
           </a:p>
@@ -2368,7 +2368,7 @@
           <a:p>
             <a:fld id="{132D6BD4-870A-4FF1-8611-FF08CC753B3A}" type="datetimeFigureOut">
               <a:rPr lang="en-CA" smtClean="0"/>
-              <a:t>2023-10-11</a:t>
+              <a:t>2023-10-12</a:t>
             </a:fld>
             <a:endParaRPr lang="en-CA"/>
           </a:p>
@@ -2581,7 +2581,7 @@
           <a:p>
             <a:fld id="{132D6BD4-870A-4FF1-8611-FF08CC753B3A}" type="datetimeFigureOut">
               <a:rPr lang="en-CA" smtClean="0"/>
-              <a:t>2023-10-11</a:t>
+              <a:t>2023-10-12</a:t>
             </a:fld>
             <a:endParaRPr lang="en-CA"/>
           </a:p>
@@ -3948,10 +3948,10 @@
         </p:nvGrpSpPr>
         <p:grpSpPr>
           <a:xfrm>
-            <a:off x="2933700" y="6137116"/>
-            <a:ext cx="2174340" cy="2637840"/>
-            <a:chOff x="3497580" y="4312920"/>
-            <a:chExt cx="2174340" cy="2637840"/>
+            <a:off x="2933700" y="6122879"/>
+            <a:ext cx="2364405" cy="2652077"/>
+            <a:chOff x="3497580" y="4298683"/>
+            <a:chExt cx="2364405" cy="2652077"/>
           </a:xfrm>
         </p:grpSpPr>
         <p:sp>
@@ -4004,7 +4004,7 @@
             <a:lstStyle/>
             <a:p>
               <a:pPr algn="ctr"/>
-              <a:endParaRPr lang="en-CA"/>
+              <a:endParaRPr lang="en-CA" dirty="0"/>
             </a:p>
           </p:txBody>
         </p:sp>
@@ -4055,6 +4055,60 @@
             </a:fontRef>
           </p:style>
         </p:cxnSp>
+        <p:sp>
+          <p:nvSpPr>
+            <p:cNvPr id="4" name="Oval 3">
+              <a:extLst>
+                <a:ext uri="{FF2B5EF4-FFF2-40B4-BE49-F238E27FC236}">
+                  <a16:creationId xmlns:a16="http://schemas.microsoft.com/office/drawing/2014/main" id="{3138A75A-4670-4890-94CE-8A02A4574154}"/>
+                </a:ext>
+              </a:extLst>
+            </p:cNvPr>
+            <p:cNvSpPr/>
+            <p:nvPr/>
+          </p:nvSpPr>
+          <p:spPr>
+            <a:xfrm>
+              <a:off x="5645985" y="4298683"/>
+              <a:ext cx="216000" cy="216000"/>
+            </a:xfrm>
+            <a:prstGeom prst="ellipse">
+              <a:avLst/>
+            </a:prstGeom>
+            <a:solidFill>
+              <a:schemeClr val="tx1"/>
+            </a:solidFill>
+            <a:ln>
+              <a:solidFill>
+                <a:schemeClr val="tx1"/>
+              </a:solidFill>
+            </a:ln>
+          </p:spPr>
+          <p:style>
+            <a:lnRef idx="2">
+              <a:schemeClr val="accent1">
+                <a:shade val="15000"/>
+              </a:schemeClr>
+            </a:lnRef>
+            <a:fillRef idx="1">
+              <a:schemeClr val="accent1"/>
+            </a:fillRef>
+            <a:effectRef idx="0">
+              <a:schemeClr val="accent1"/>
+            </a:effectRef>
+            <a:fontRef idx="minor">
+              <a:schemeClr val="lt1"/>
+            </a:fontRef>
+          </p:style>
+          <p:txBody>
+            <a:bodyPr rtlCol="0" anchor="ctr"/>
+            <a:lstStyle/>
+            <a:p>
+              <a:pPr algn="ctr"/>
+              <a:endParaRPr lang="en-CA" dirty="0"/>
+            </a:p>
+          </p:txBody>
+        </p:sp>
       </p:grpSp>
       <p:sp>
         <p:nvSpPr>
@@ -4290,15 +4344,15 @@
             </a:extLst>
           </p:cNvPr>
           <p:cNvCxnSpPr>
-            <a:stCxn id="81" idx="2"/>
+            <a:cxnSpLocks/>
             <a:endCxn id="96" idx="0"/>
           </p:cNvCxnSpPr>
           <p:nvPr/>
         </p:nvCxnSpPr>
         <p:spPr>
           <a:xfrm flipH="1">
-            <a:off x="3318411" y="6405240"/>
-            <a:ext cx="1915363" cy="2204829"/>
+            <a:off x="3318410" y="6245116"/>
+            <a:ext cx="1891765" cy="2364952"/>
           </a:xfrm>
           <a:prstGeom prst="straightConnector1">
             <a:avLst/>
@@ -5698,15 +5752,16 @@
             </a:extLst>
           </p:cNvPr>
           <p:cNvCxnSpPr>
-            <a:stCxn id="4" idx="2"/>
+            <a:cxnSpLocks/>
+            <a:stCxn id="7" idx="4"/>
             <a:endCxn id="102" idx="0"/>
           </p:cNvCxnSpPr>
           <p:nvPr/>
         </p:nvCxnSpPr>
         <p:spPr>
           <a:xfrm flipH="1">
-            <a:off x="3292326" y="10258085"/>
-            <a:ext cx="293623" cy="783472"/>
+            <a:off x="3292326" y="10182290"/>
+            <a:ext cx="282749" cy="859267"/>
           </a:xfrm>
           <a:prstGeom prst="straightConnector1">
             <a:avLst/>
@@ -5801,10 +5856,10 @@
         </p:nvGrpSpPr>
         <p:grpSpPr>
           <a:xfrm>
-            <a:off x="3594100" y="8592962"/>
-            <a:ext cx="1270100" cy="1215390"/>
-            <a:chOff x="2443480" y="4312920"/>
-            <a:chExt cx="1270100" cy="1215390"/>
+            <a:off x="3783279" y="8592962"/>
+            <a:ext cx="1080921" cy="1160844"/>
+            <a:chOff x="2632659" y="4312920"/>
+            <a:chExt cx="1080921" cy="1160844"/>
           </a:xfrm>
         </p:grpSpPr>
         <p:sp>
@@ -5879,13 +5934,13 @@
           </p:nvCxnSpPr>
           <p:spPr>
             <a:xfrm flipH="1">
-              <a:off x="2443480" y="4420920"/>
-              <a:ext cx="1270100" cy="1107390"/>
+              <a:off x="2632659" y="4420920"/>
+              <a:ext cx="1080921" cy="1052844"/>
             </a:xfrm>
             <a:prstGeom prst="curvedConnector4">
               <a:avLst>
-                <a:gd name="adj1" fmla="val -17999"/>
-                <a:gd name="adj2" fmla="val 54876"/>
+                <a:gd name="adj1" fmla="val -21149"/>
+                <a:gd name="adj2" fmla="val 55129"/>
               </a:avLst>
             </a:prstGeom>
             <a:ln w="25400">
@@ -5924,7 +5979,7 @@
         </p:nvSpPr>
         <p:spPr>
           <a:xfrm>
-            <a:off x="3486100" y="9808352"/>
+            <a:off x="3675279" y="9753806"/>
             <a:ext cx="216000" cy="216000"/>
           </a:xfrm>
           <a:prstGeom prst="ellipse">
@@ -6383,6 +6438,60 @@
               <a:rPr lang="en-US" dirty="0" err="1"/>
               <a:t>arr</a:t>
             </a:r>
+            <a:endParaRPr lang="en-CA" dirty="0"/>
+          </a:p>
+        </p:txBody>
+      </p:sp>
+      <p:sp>
+        <p:nvSpPr>
+          <p:cNvPr id="7" name="Oval 6">
+            <a:extLst>
+              <a:ext uri="{FF2B5EF4-FFF2-40B4-BE49-F238E27FC236}">
+                <a16:creationId xmlns:a16="http://schemas.microsoft.com/office/drawing/2014/main" id="{876E6E03-1943-07E4-2B5E-ADA1DEDAFE15}"/>
+              </a:ext>
+            </a:extLst>
+          </p:cNvPr>
+          <p:cNvSpPr/>
+          <p:nvPr/>
+        </p:nvSpPr>
+        <p:spPr>
+          <a:xfrm>
+            <a:off x="3467075" y="9966290"/>
+            <a:ext cx="216000" cy="216000"/>
+          </a:xfrm>
+          <a:prstGeom prst="ellipse">
+            <a:avLst/>
+          </a:prstGeom>
+          <a:solidFill>
+            <a:schemeClr val="tx1"/>
+          </a:solidFill>
+          <a:ln>
+            <a:solidFill>
+              <a:schemeClr val="tx1"/>
+            </a:solidFill>
+          </a:ln>
+        </p:spPr>
+        <p:style>
+          <a:lnRef idx="2">
+            <a:schemeClr val="accent1">
+              <a:shade val="15000"/>
+            </a:schemeClr>
+          </a:lnRef>
+          <a:fillRef idx="1">
+            <a:schemeClr val="accent1"/>
+          </a:fillRef>
+          <a:effectRef idx="0">
+            <a:schemeClr val="accent1"/>
+          </a:effectRef>
+          <a:fontRef idx="minor">
+            <a:schemeClr val="lt1"/>
+          </a:fontRef>
+        </p:style>
+        <p:txBody>
+          <a:bodyPr rtlCol="0" anchor="ctr"/>
+          <a:lstStyle/>
+          <a:p>
+            <a:pPr algn="ctr"/>
             <a:endParaRPr lang="en-CA" dirty="0"/>
           </a:p>
         </p:txBody>

</xml_diff>

<commit_message>
improved ar diagram for lab3 exA
</commit_message>
<xml_diff>
--- a/labs/labs/lab3/documents/drawing.pptx
+++ b/labs/labs/lab3/documents/drawing.pptx
@@ -4813,10 +4813,10 @@
         </p:nvGrpSpPr>
         <p:grpSpPr>
           <a:xfrm>
-            <a:off x="2960270" y="10198504"/>
-            <a:ext cx="2545180" cy="1237276"/>
-            <a:chOff x="3352800" y="1012190"/>
-            <a:chExt cx="2545180" cy="1237276"/>
+            <a:off x="2960270" y="10088663"/>
+            <a:ext cx="2544011" cy="1347117"/>
+            <a:chOff x="3352800" y="902349"/>
+            <a:chExt cx="2544011" cy="1347117"/>
           </a:xfrm>
         </p:grpSpPr>
         <p:grpSp>
@@ -4975,7 +4975,7 @@
           </p:nvSpPr>
           <p:spPr>
             <a:xfrm>
-              <a:off x="5219800" y="1012190"/>
+              <a:off x="5218631" y="902349"/>
               <a:ext cx="678180" cy="367326"/>
             </a:xfrm>
             <a:prstGeom prst="rect">
@@ -5295,9 +5295,9 @@
         <p:grpSpPr>
           <a:xfrm>
             <a:off x="2914650" y="8580262"/>
-            <a:ext cx="2152600" cy="1596440"/>
+            <a:ext cx="1776931" cy="1691674"/>
             <a:chOff x="3497580" y="4312920"/>
-            <a:chExt cx="2152600" cy="1596440"/>
+            <a:chExt cx="1776931" cy="1691674"/>
           </a:xfrm>
         </p:grpSpPr>
         <p:sp>
@@ -5373,7 +5373,7 @@
           <p:spPr>
             <a:xfrm>
               <a:off x="3713580" y="4420920"/>
-              <a:ext cx="1936600" cy="1488440"/>
+              <a:ext cx="1560931" cy="1583674"/>
             </a:xfrm>
             <a:prstGeom prst="curvedConnector3">
               <a:avLst>
@@ -5468,7 +5468,7 @@
         </p:nvSpPr>
         <p:spPr>
           <a:xfrm>
-            <a:off x="5067250" y="10068702"/>
+            <a:off x="4691581" y="10163936"/>
             <a:ext cx="216000" cy="216000"/>
           </a:xfrm>
           <a:prstGeom prst="ellipse">
@@ -5804,7 +5804,7 @@
         </p:nvSpPr>
         <p:spPr>
           <a:xfrm>
-            <a:off x="4828440" y="10197007"/>
+            <a:off x="4827270" y="10072038"/>
             <a:ext cx="677011" cy="399796"/>
           </a:xfrm>
           <a:prstGeom prst="rect">
@@ -6493,6 +6493,48 @@
           <a:p>
             <a:pPr algn="ctr"/>
             <a:endParaRPr lang="en-CA" dirty="0"/>
+          </a:p>
+        </p:txBody>
+      </p:sp>
+      <p:sp>
+        <p:nvSpPr>
+          <p:cNvPr id="9" name="TextBox 8">
+            <a:extLst>
+              <a:ext uri="{FF2B5EF4-FFF2-40B4-BE49-F238E27FC236}">
+                <a16:creationId xmlns:a16="http://schemas.microsoft.com/office/drawing/2014/main" id="{3B51D56D-ED65-81D3-3FB4-5B21E1844E10}"/>
+              </a:ext>
+            </a:extLst>
+          </p:cNvPr>
+          <p:cNvSpPr txBox="1"/>
+          <p:nvPr/>
+        </p:nvSpPr>
+        <p:spPr>
+          <a:xfrm>
+            <a:off x="4764065" y="10471068"/>
+            <a:ext cx="805029" cy="400110"/>
+          </a:xfrm>
+          <a:prstGeom prst="rect">
+            <a:avLst/>
+          </a:prstGeom>
+          <a:noFill/>
+        </p:spPr>
+        <p:txBody>
+          <a:bodyPr wrap="none" rtlCol="0">
+            <a:spAutoFit/>
+          </a:bodyPr>
+          <a:lstStyle/>
+          <a:p>
+            <a:r>
+              <a:rPr lang="en-CA" sz="1000" dirty="0"/>
+              <a:t>Temporary</a:t>
+            </a:r>
+            <a:br>
+              <a:rPr lang="en-CA" sz="1000" dirty="0"/>
+            </a:br>
+            <a:r>
+              <a:rPr lang="en-CA" sz="1000" dirty="0"/>
+              <a:t>Anonymous</a:t>
+            </a:r>
           </a:p>
         </p:txBody>
       </p:sp>

</xml_diff>